<commit_message>
Modifico una filmina de la presentacion
</commit_message>
<xml_diff>
--- a/Trabajo Practico/Practico_3/PRESENTACION GRUPO 5(3er desafio).pptx
+++ b/Trabajo Practico/Practico_3/PRESENTACION GRUPO 5(3er desafio).pptx
@@ -3352,7 +3352,7 @@
           <a:p>
             <a:fld id="{97AB3EA8-A58D-4C92-A3AB-D271CCC294C7}" type="datetimeFigureOut">
               <a:rPr lang="en-US" smtClean="0"/>
-              <a:t>11/24/21</a:t>
+              <a:t>11/26/21</a:t>
             </a:fld>
             <a:endParaRPr lang="en-US" dirty="0"/>
           </a:p>
@@ -3529,7 +3529,7 @@
           <a:p>
             <a:fld id="{0AEFB4FA-E877-413E-B608-88789D806C57}" type="datetimeFigureOut">
               <a:rPr lang="en-US" noProof="0" smtClean="0"/>
-              <a:t>11/24/21</a:t>
+              <a:t>11/26/21</a:t>
             </a:fld>
             <a:endParaRPr lang="en-US" noProof="0" dirty="0"/>
           </a:p>
@@ -18248,7 +18248,7 @@
           <a:p>
             <a:fld id="{D951F27F-98F9-A147-8986-34441C7B752D}" type="datetime1">
               <a:rPr lang="en-US" noProof="0" smtClean="0"/>
-              <a:t>11/24/21</a:t>
+              <a:t>11/26/21</a:t>
             </a:fld>
             <a:endParaRPr lang="en-US" noProof="0" dirty="0"/>
           </a:p>
@@ -19497,7 +19497,7 @@
           <a:p>
             <a:r>
               <a:rPr lang="es-ES" dirty="0"/>
-              <a:t>contenido</a:t>
+              <a:t>ROAD MAP</a:t>
             </a:r>
             <a:endParaRPr lang="es-AR" dirty="0"/>
           </a:p>
@@ -22554,7 +22554,7 @@
         </p:nvSpPr>
         <p:spPr>
           <a:xfrm>
-            <a:off x="515938" y="1253331"/>
+            <a:off x="507556" y="910431"/>
             <a:ext cx="10313987" cy="4351338"/>
           </a:xfrm>
         </p:spPr>
@@ -22593,7 +22593,7 @@
         </p:nvSpPr>
         <p:spPr>
           <a:xfrm>
-            <a:off x="520700" y="0"/>
+            <a:off x="507556" y="-245274"/>
             <a:ext cx="11150600" cy="920336"/>
           </a:xfrm>
         </p:spPr>
@@ -22634,7 +22634,7 @@
         </p:blipFill>
         <p:spPr>
           <a:xfrm>
-            <a:off x="762000" y="2635664"/>
+            <a:off x="800100" y="2612836"/>
             <a:ext cx="9239250" cy="3631786"/>
           </a:xfrm>
           <a:prstGeom prst="rect">

</xml_diff>